<commit_message>
Updating some stuff and moving it around.
</commit_message>
<xml_diff>
--- a/Week_1/Lectures/Lecture_1_Slides.pptx
+++ b/Week_1/Lectures/Lecture_1_Slides.pptx
@@ -127,6 +127,10 @@
 </p:presentation>
 </file>
 
+<file path=ppt/revisionInfo.xml><?xml version="1.0" encoding="utf-8"?>
+<p1510:revInfo xmlns:a="http://schemas.openxmlformats.org/drawingml/2006/main" xmlns:r="http://schemas.openxmlformats.org/officeDocument/2006/relationships" xmlns:p1510="http://schemas.microsoft.com/office/powerpoint/2015/10/main"/>
+</file>
+
 <file path=ppt/slideLayouts/slideLayout1.xml><?xml version="1.0" encoding="utf-8"?>
 <p:sldLayout xmlns:a="http://schemas.openxmlformats.org/drawingml/2006/main" xmlns:r="http://schemas.openxmlformats.org/officeDocument/2006/relationships" xmlns:p="http://schemas.openxmlformats.org/presentationml/2006/main" type="title" preserve="1">
   <p:cSld name="Title Slide">
@@ -169,10 +173,9 @@
           </a:lstStyle>
           <a:p>
             <a:r>
-              <a:rPr lang="en-US" smtClean="0"/>
+              <a:rPr lang="en-US"/>
               <a:t>Click to edit Master title style</a:t>
             </a:r>
-            <a:endParaRPr lang="en-US"/>
           </a:p>
         </p:txBody>
       </p:sp>
@@ -234,10 +237,9 @@
           </a:lstStyle>
           <a:p>
             <a:r>
-              <a:rPr lang="en-US" smtClean="0"/>
+              <a:rPr lang="en-US"/>
               <a:t>Click to edit Master subtitle style</a:t>
             </a:r>
-            <a:endParaRPr lang="en-US"/>
           </a:p>
         </p:txBody>
       </p:sp>
@@ -258,7 +260,7 @@
           <a:p>
             <a:fld id="{9C1EC067-AA84-4553-AA47-178FC1757A77}" type="datetimeFigureOut">
               <a:rPr lang="en-US" smtClean="0"/>
-              <a:t>1/1/2017</a:t>
+              <a:t>12/29/2017</a:t>
             </a:fld>
             <a:endParaRPr lang="en-US"/>
           </a:p>
@@ -352,10 +354,9 @@
           <a:lstStyle/>
           <a:p>
             <a:r>
-              <a:rPr lang="en-US" smtClean="0"/>
+              <a:rPr lang="en-US"/>
               <a:t>Click to edit Master title style</a:t>
             </a:r>
-            <a:endParaRPr lang="en-US"/>
           </a:p>
         </p:txBody>
       </p:sp>
@@ -376,38 +377,37 @@
           <a:p>
             <a:pPr lvl="0"/>
             <a:r>
-              <a:rPr lang="en-US" smtClean="0"/>
+              <a:rPr lang="en-US"/>
               <a:t>Click to edit Master text styles</a:t>
             </a:r>
           </a:p>
           <a:p>
             <a:pPr lvl="1"/>
             <a:r>
-              <a:rPr lang="en-US" smtClean="0"/>
+              <a:rPr lang="en-US"/>
               <a:t>Second level</a:t>
             </a:r>
           </a:p>
           <a:p>
             <a:pPr lvl="2"/>
             <a:r>
-              <a:rPr lang="en-US" smtClean="0"/>
+              <a:rPr lang="en-US"/>
               <a:t>Third level</a:t>
             </a:r>
           </a:p>
           <a:p>
             <a:pPr lvl="3"/>
             <a:r>
-              <a:rPr lang="en-US" smtClean="0"/>
+              <a:rPr lang="en-US"/>
               <a:t>Fourth level</a:t>
             </a:r>
           </a:p>
           <a:p>
             <a:pPr lvl="4"/>
             <a:r>
-              <a:rPr lang="en-US" smtClean="0"/>
+              <a:rPr lang="en-US"/>
               <a:t>Fifth level</a:t>
             </a:r>
-            <a:endParaRPr lang="en-US"/>
           </a:p>
         </p:txBody>
       </p:sp>
@@ -428,7 +428,7 @@
           <a:p>
             <a:fld id="{9C1EC067-AA84-4553-AA47-178FC1757A77}" type="datetimeFigureOut">
               <a:rPr lang="en-US" smtClean="0"/>
-              <a:t>1/1/2017</a:t>
+              <a:t>12/29/2017</a:t>
             </a:fld>
             <a:endParaRPr lang="en-US"/>
           </a:p>
@@ -527,10 +527,9 @@
           <a:lstStyle/>
           <a:p>
             <a:r>
-              <a:rPr lang="en-US" smtClean="0"/>
+              <a:rPr lang="en-US"/>
               <a:t>Click to edit Master title style</a:t>
             </a:r>
-            <a:endParaRPr lang="en-US"/>
           </a:p>
         </p:txBody>
       </p:sp>
@@ -556,38 +555,37 @@
           <a:p>
             <a:pPr lvl="0"/>
             <a:r>
-              <a:rPr lang="en-US" smtClean="0"/>
+              <a:rPr lang="en-US"/>
               <a:t>Click to edit Master text styles</a:t>
             </a:r>
           </a:p>
           <a:p>
             <a:pPr lvl="1"/>
             <a:r>
-              <a:rPr lang="en-US" smtClean="0"/>
+              <a:rPr lang="en-US"/>
               <a:t>Second level</a:t>
             </a:r>
           </a:p>
           <a:p>
             <a:pPr lvl="2"/>
             <a:r>
-              <a:rPr lang="en-US" smtClean="0"/>
+              <a:rPr lang="en-US"/>
               <a:t>Third level</a:t>
             </a:r>
           </a:p>
           <a:p>
             <a:pPr lvl="3"/>
             <a:r>
-              <a:rPr lang="en-US" smtClean="0"/>
+              <a:rPr lang="en-US"/>
               <a:t>Fourth level</a:t>
             </a:r>
           </a:p>
           <a:p>
             <a:pPr lvl="4"/>
             <a:r>
-              <a:rPr lang="en-US" smtClean="0"/>
+              <a:rPr lang="en-US"/>
               <a:t>Fifth level</a:t>
             </a:r>
-            <a:endParaRPr lang="en-US"/>
           </a:p>
         </p:txBody>
       </p:sp>
@@ -608,7 +606,7 @@
           <a:p>
             <a:fld id="{9C1EC067-AA84-4553-AA47-178FC1757A77}" type="datetimeFigureOut">
               <a:rPr lang="en-US" smtClean="0"/>
-              <a:t>1/1/2017</a:t>
+              <a:t>12/29/2017</a:t>
             </a:fld>
             <a:endParaRPr lang="en-US"/>
           </a:p>
@@ -702,10 +700,9 @@
           <a:lstStyle/>
           <a:p>
             <a:r>
-              <a:rPr lang="en-US" smtClean="0"/>
+              <a:rPr lang="en-US"/>
               <a:t>Click to edit Master title style</a:t>
             </a:r>
-            <a:endParaRPr lang="en-US"/>
           </a:p>
         </p:txBody>
       </p:sp>
@@ -726,38 +723,37 @@
           <a:p>
             <a:pPr lvl="0"/>
             <a:r>
-              <a:rPr lang="en-US" smtClean="0"/>
+              <a:rPr lang="en-US"/>
               <a:t>Click to edit Master text styles</a:t>
             </a:r>
           </a:p>
           <a:p>
             <a:pPr lvl="1"/>
             <a:r>
-              <a:rPr lang="en-US" smtClean="0"/>
+              <a:rPr lang="en-US"/>
               <a:t>Second level</a:t>
             </a:r>
           </a:p>
           <a:p>
             <a:pPr lvl="2"/>
             <a:r>
-              <a:rPr lang="en-US" smtClean="0"/>
+              <a:rPr lang="en-US"/>
               <a:t>Third level</a:t>
             </a:r>
           </a:p>
           <a:p>
             <a:pPr lvl="3"/>
             <a:r>
-              <a:rPr lang="en-US" smtClean="0"/>
+              <a:rPr lang="en-US"/>
               <a:t>Fourth level</a:t>
             </a:r>
           </a:p>
           <a:p>
             <a:pPr lvl="4"/>
             <a:r>
-              <a:rPr lang="en-US" smtClean="0"/>
+              <a:rPr lang="en-US"/>
               <a:t>Fifth level</a:t>
             </a:r>
-            <a:endParaRPr lang="en-US"/>
           </a:p>
         </p:txBody>
       </p:sp>
@@ -778,7 +774,7 @@
           <a:p>
             <a:fld id="{9C1EC067-AA84-4553-AA47-178FC1757A77}" type="datetimeFigureOut">
               <a:rPr lang="en-US" smtClean="0"/>
-              <a:t>1/1/2017</a:t>
+              <a:t>12/29/2017</a:t>
             </a:fld>
             <a:endParaRPr lang="en-US"/>
           </a:p>
@@ -881,10 +877,9 @@
           </a:lstStyle>
           <a:p>
             <a:r>
-              <a:rPr lang="en-US" smtClean="0"/>
+              <a:rPr lang="en-US"/>
               <a:t>Click to edit Master title style</a:t>
             </a:r>
-            <a:endParaRPr lang="en-US"/>
           </a:p>
         </p:txBody>
       </p:sp>
@@ -1001,7 +996,7 @@
           <a:p>
             <a:pPr lvl="0"/>
             <a:r>
-              <a:rPr lang="en-US" smtClean="0"/>
+              <a:rPr lang="en-US"/>
               <a:t>Click to edit Master text styles</a:t>
             </a:r>
           </a:p>
@@ -1024,7 +1019,7 @@
           <a:p>
             <a:fld id="{9C1EC067-AA84-4553-AA47-178FC1757A77}" type="datetimeFigureOut">
               <a:rPr lang="en-US" smtClean="0"/>
-              <a:t>1/1/2017</a:t>
+              <a:t>12/29/2017</a:t>
             </a:fld>
             <a:endParaRPr lang="en-US"/>
           </a:p>
@@ -1118,10 +1113,9 @@
           <a:lstStyle/>
           <a:p>
             <a:r>
-              <a:rPr lang="en-US" smtClean="0"/>
+              <a:rPr lang="en-US"/>
               <a:t>Click to edit Master title style</a:t>
             </a:r>
-            <a:endParaRPr lang="en-US"/>
           </a:p>
         </p:txBody>
       </p:sp>
@@ -1147,38 +1141,37 @@
           <a:p>
             <a:pPr lvl="0"/>
             <a:r>
-              <a:rPr lang="en-US" smtClean="0"/>
+              <a:rPr lang="en-US"/>
               <a:t>Click to edit Master text styles</a:t>
             </a:r>
           </a:p>
           <a:p>
             <a:pPr lvl="1"/>
             <a:r>
-              <a:rPr lang="en-US" smtClean="0"/>
+              <a:rPr lang="en-US"/>
               <a:t>Second level</a:t>
             </a:r>
           </a:p>
           <a:p>
             <a:pPr lvl="2"/>
             <a:r>
-              <a:rPr lang="en-US" smtClean="0"/>
+              <a:rPr lang="en-US"/>
               <a:t>Third level</a:t>
             </a:r>
           </a:p>
           <a:p>
             <a:pPr lvl="3"/>
             <a:r>
-              <a:rPr lang="en-US" smtClean="0"/>
+              <a:rPr lang="en-US"/>
               <a:t>Fourth level</a:t>
             </a:r>
           </a:p>
           <a:p>
             <a:pPr lvl="4"/>
             <a:r>
-              <a:rPr lang="en-US" smtClean="0"/>
+              <a:rPr lang="en-US"/>
               <a:t>Fifth level</a:t>
             </a:r>
-            <a:endParaRPr lang="en-US"/>
           </a:p>
         </p:txBody>
       </p:sp>
@@ -1204,38 +1197,37 @@
           <a:p>
             <a:pPr lvl="0"/>
             <a:r>
-              <a:rPr lang="en-US" smtClean="0"/>
+              <a:rPr lang="en-US"/>
               <a:t>Click to edit Master text styles</a:t>
             </a:r>
           </a:p>
           <a:p>
             <a:pPr lvl="1"/>
             <a:r>
-              <a:rPr lang="en-US" smtClean="0"/>
+              <a:rPr lang="en-US"/>
               <a:t>Second level</a:t>
             </a:r>
           </a:p>
           <a:p>
             <a:pPr lvl="2"/>
             <a:r>
-              <a:rPr lang="en-US" smtClean="0"/>
+              <a:rPr lang="en-US"/>
               <a:t>Third level</a:t>
             </a:r>
           </a:p>
           <a:p>
             <a:pPr lvl="3"/>
             <a:r>
-              <a:rPr lang="en-US" smtClean="0"/>
+              <a:rPr lang="en-US"/>
               <a:t>Fourth level</a:t>
             </a:r>
           </a:p>
           <a:p>
             <a:pPr lvl="4"/>
             <a:r>
-              <a:rPr lang="en-US" smtClean="0"/>
+              <a:rPr lang="en-US"/>
               <a:t>Fifth level</a:t>
             </a:r>
-            <a:endParaRPr lang="en-US"/>
           </a:p>
         </p:txBody>
       </p:sp>
@@ -1256,7 +1248,7 @@
           <a:p>
             <a:fld id="{9C1EC067-AA84-4553-AA47-178FC1757A77}" type="datetimeFigureOut">
               <a:rPr lang="en-US" smtClean="0"/>
-              <a:t>1/1/2017</a:t>
+              <a:t>12/29/2017</a:t>
             </a:fld>
             <a:endParaRPr lang="en-US"/>
           </a:p>
@@ -1355,10 +1347,9 @@
           <a:lstStyle/>
           <a:p>
             <a:r>
-              <a:rPr lang="en-US" smtClean="0"/>
+              <a:rPr lang="en-US"/>
               <a:t>Click to edit Master title style</a:t>
             </a:r>
-            <a:endParaRPr lang="en-US"/>
           </a:p>
         </p:txBody>
       </p:sp>
@@ -1421,7 +1412,7 @@
           <a:p>
             <a:pPr lvl="0"/>
             <a:r>
-              <a:rPr lang="en-US" smtClean="0"/>
+              <a:rPr lang="en-US"/>
               <a:t>Click to edit Master text styles</a:t>
             </a:r>
           </a:p>
@@ -1449,38 +1440,37 @@
           <a:p>
             <a:pPr lvl="0"/>
             <a:r>
-              <a:rPr lang="en-US" smtClean="0"/>
+              <a:rPr lang="en-US"/>
               <a:t>Click to edit Master text styles</a:t>
             </a:r>
           </a:p>
           <a:p>
             <a:pPr lvl="1"/>
             <a:r>
-              <a:rPr lang="en-US" smtClean="0"/>
+              <a:rPr lang="en-US"/>
               <a:t>Second level</a:t>
             </a:r>
           </a:p>
           <a:p>
             <a:pPr lvl="2"/>
             <a:r>
-              <a:rPr lang="en-US" smtClean="0"/>
+              <a:rPr lang="en-US"/>
               <a:t>Third level</a:t>
             </a:r>
           </a:p>
           <a:p>
             <a:pPr lvl="3"/>
             <a:r>
-              <a:rPr lang="en-US" smtClean="0"/>
+              <a:rPr lang="en-US"/>
               <a:t>Fourth level</a:t>
             </a:r>
           </a:p>
           <a:p>
             <a:pPr lvl="4"/>
             <a:r>
-              <a:rPr lang="en-US" smtClean="0"/>
+              <a:rPr lang="en-US"/>
               <a:t>Fifth level</a:t>
             </a:r>
-            <a:endParaRPr lang="en-US"/>
           </a:p>
         </p:txBody>
       </p:sp>
@@ -1543,7 +1533,7 @@
           <a:p>
             <a:pPr lvl="0"/>
             <a:r>
-              <a:rPr lang="en-US" smtClean="0"/>
+              <a:rPr lang="en-US"/>
               <a:t>Click to edit Master text styles</a:t>
             </a:r>
           </a:p>
@@ -1571,38 +1561,37 @@
           <a:p>
             <a:pPr lvl="0"/>
             <a:r>
-              <a:rPr lang="en-US" smtClean="0"/>
+              <a:rPr lang="en-US"/>
               <a:t>Click to edit Master text styles</a:t>
             </a:r>
           </a:p>
           <a:p>
             <a:pPr lvl="1"/>
             <a:r>
-              <a:rPr lang="en-US" smtClean="0"/>
+              <a:rPr lang="en-US"/>
               <a:t>Second level</a:t>
             </a:r>
           </a:p>
           <a:p>
             <a:pPr lvl="2"/>
             <a:r>
-              <a:rPr lang="en-US" smtClean="0"/>
+              <a:rPr lang="en-US"/>
               <a:t>Third level</a:t>
             </a:r>
           </a:p>
           <a:p>
             <a:pPr lvl="3"/>
             <a:r>
-              <a:rPr lang="en-US" smtClean="0"/>
+              <a:rPr lang="en-US"/>
               <a:t>Fourth level</a:t>
             </a:r>
           </a:p>
           <a:p>
             <a:pPr lvl="4"/>
             <a:r>
-              <a:rPr lang="en-US" smtClean="0"/>
+              <a:rPr lang="en-US"/>
               <a:t>Fifth level</a:t>
             </a:r>
-            <a:endParaRPr lang="en-US"/>
           </a:p>
         </p:txBody>
       </p:sp>
@@ -1623,7 +1612,7 @@
           <a:p>
             <a:fld id="{9C1EC067-AA84-4553-AA47-178FC1757A77}" type="datetimeFigureOut">
               <a:rPr lang="en-US" smtClean="0"/>
-              <a:t>1/1/2017</a:t>
+              <a:t>12/29/2017</a:t>
             </a:fld>
             <a:endParaRPr lang="en-US"/>
           </a:p>
@@ -1717,10 +1706,9 @@
           <a:lstStyle/>
           <a:p>
             <a:r>
-              <a:rPr lang="en-US" smtClean="0"/>
+              <a:rPr lang="en-US"/>
               <a:t>Click to edit Master title style</a:t>
             </a:r>
-            <a:endParaRPr lang="en-US"/>
           </a:p>
         </p:txBody>
       </p:sp>
@@ -1741,7 +1729,7 @@
           <a:p>
             <a:fld id="{9C1EC067-AA84-4553-AA47-178FC1757A77}" type="datetimeFigureOut">
               <a:rPr lang="en-US" smtClean="0"/>
-              <a:t>1/1/2017</a:t>
+              <a:t>12/29/2017</a:t>
             </a:fld>
             <a:endParaRPr lang="en-US"/>
           </a:p>
@@ -1836,7 +1824,7 @@
           <a:p>
             <a:fld id="{9C1EC067-AA84-4553-AA47-178FC1757A77}" type="datetimeFigureOut">
               <a:rPr lang="en-US" smtClean="0"/>
-              <a:t>1/1/2017</a:t>
+              <a:t>12/29/2017</a:t>
             </a:fld>
             <a:endParaRPr lang="en-US"/>
           </a:p>
@@ -1939,10 +1927,9 @@
           </a:lstStyle>
           <a:p>
             <a:r>
-              <a:rPr lang="en-US" smtClean="0"/>
+              <a:rPr lang="en-US"/>
               <a:t>Click to edit Master title style</a:t>
             </a:r>
-            <a:endParaRPr lang="en-US"/>
           </a:p>
         </p:txBody>
       </p:sp>
@@ -1996,38 +1983,37 @@
           <a:p>
             <a:pPr lvl="0"/>
             <a:r>
-              <a:rPr lang="en-US" smtClean="0"/>
+              <a:rPr lang="en-US"/>
               <a:t>Click to edit Master text styles</a:t>
             </a:r>
           </a:p>
           <a:p>
             <a:pPr lvl="1"/>
             <a:r>
-              <a:rPr lang="en-US" smtClean="0"/>
+              <a:rPr lang="en-US"/>
               <a:t>Second level</a:t>
             </a:r>
           </a:p>
           <a:p>
             <a:pPr lvl="2"/>
             <a:r>
-              <a:rPr lang="en-US" smtClean="0"/>
+              <a:rPr lang="en-US"/>
               <a:t>Third level</a:t>
             </a:r>
           </a:p>
           <a:p>
             <a:pPr lvl="3"/>
             <a:r>
-              <a:rPr lang="en-US" smtClean="0"/>
+              <a:rPr lang="en-US"/>
               <a:t>Fourth level</a:t>
             </a:r>
           </a:p>
           <a:p>
             <a:pPr lvl="4"/>
             <a:r>
-              <a:rPr lang="en-US" smtClean="0"/>
+              <a:rPr lang="en-US"/>
               <a:t>Fifth level</a:t>
             </a:r>
-            <a:endParaRPr lang="en-US"/>
           </a:p>
         </p:txBody>
       </p:sp>
@@ -2090,7 +2076,7 @@
           <a:p>
             <a:pPr lvl="0"/>
             <a:r>
-              <a:rPr lang="en-US" smtClean="0"/>
+              <a:rPr lang="en-US"/>
               <a:t>Click to edit Master text styles</a:t>
             </a:r>
           </a:p>
@@ -2113,7 +2099,7 @@
           <a:p>
             <a:fld id="{9C1EC067-AA84-4553-AA47-178FC1757A77}" type="datetimeFigureOut">
               <a:rPr lang="en-US" smtClean="0"/>
-              <a:t>1/1/2017</a:t>
+              <a:t>12/29/2017</a:t>
             </a:fld>
             <a:endParaRPr lang="en-US"/>
           </a:p>
@@ -2216,10 +2202,9 @@
           </a:lstStyle>
           <a:p>
             <a:r>
-              <a:rPr lang="en-US" smtClean="0"/>
+              <a:rPr lang="en-US"/>
               <a:t>Click to edit Master title style</a:t>
             </a:r>
-            <a:endParaRPr lang="en-US"/>
           </a:p>
         </p:txBody>
       </p:sp>
@@ -2343,7 +2328,7 @@
           <a:p>
             <a:pPr lvl="0"/>
             <a:r>
-              <a:rPr lang="en-US" smtClean="0"/>
+              <a:rPr lang="en-US"/>
               <a:t>Click to edit Master text styles</a:t>
             </a:r>
           </a:p>
@@ -2366,7 +2351,7 @@
           <a:p>
             <a:fld id="{9C1EC067-AA84-4553-AA47-178FC1757A77}" type="datetimeFigureOut">
               <a:rPr lang="en-US" smtClean="0"/>
-              <a:t>1/1/2017</a:t>
+              <a:t>12/29/2017</a:t>
             </a:fld>
             <a:endParaRPr lang="en-US"/>
           </a:p>
@@ -2475,10 +2460,9 @@
           <a:lstStyle/>
           <a:p>
             <a:r>
-              <a:rPr lang="en-US" smtClean="0"/>
+              <a:rPr lang="en-US"/>
               <a:t>Click to edit Master title style</a:t>
             </a:r>
-            <a:endParaRPr lang="en-US"/>
           </a:p>
         </p:txBody>
       </p:sp>
@@ -2509,38 +2493,37 @@
           <a:p>
             <a:pPr lvl="0"/>
             <a:r>
-              <a:rPr lang="en-US" smtClean="0"/>
+              <a:rPr lang="en-US"/>
               <a:t>Click to edit Master text styles</a:t>
             </a:r>
           </a:p>
           <a:p>
             <a:pPr lvl="1"/>
             <a:r>
-              <a:rPr lang="en-US" smtClean="0"/>
+              <a:rPr lang="en-US"/>
               <a:t>Second level</a:t>
             </a:r>
           </a:p>
           <a:p>
             <a:pPr lvl="2"/>
             <a:r>
-              <a:rPr lang="en-US" smtClean="0"/>
+              <a:rPr lang="en-US"/>
               <a:t>Third level</a:t>
             </a:r>
           </a:p>
           <a:p>
             <a:pPr lvl="3"/>
             <a:r>
-              <a:rPr lang="en-US" smtClean="0"/>
+              <a:rPr lang="en-US"/>
               <a:t>Fourth level</a:t>
             </a:r>
           </a:p>
           <a:p>
             <a:pPr lvl="4"/>
             <a:r>
-              <a:rPr lang="en-US" smtClean="0"/>
+              <a:rPr lang="en-US"/>
               <a:t>Fifth level</a:t>
             </a:r>
-            <a:endParaRPr lang="en-US"/>
           </a:p>
         </p:txBody>
       </p:sp>
@@ -2579,7 +2562,7 @@
           <a:p>
             <a:fld id="{9C1EC067-AA84-4553-AA47-178FC1757A77}" type="datetimeFigureOut">
               <a:rPr lang="en-US" smtClean="0"/>
-              <a:t>1/1/2017</a:t>
+              <a:t>12/29/2017</a:t>
             </a:fld>
             <a:endParaRPr lang="en-US"/>
           </a:p>
@@ -3000,10 +2983,9 @@
           <a:lstStyle/>
           <a:p>
             <a:r>
-              <a:rPr lang="en-US" dirty="0" smtClean="0"/>
+              <a:rPr lang="en-US" dirty="0"/>
               <a:t>Python Basics</a:t>
             </a:r>
-            <a:endParaRPr lang="en-US" dirty="0"/>
           </a:p>
         </p:txBody>
       </p:sp>
@@ -3023,10 +3005,9 @@
           <a:lstStyle/>
           <a:p>
             <a:r>
-              <a:rPr lang="en-US" dirty="0" smtClean="0"/>
+              <a:rPr lang="en-US" dirty="0"/>
               <a:t>Gregory Brunner</a:t>
             </a:r>
-            <a:endParaRPr lang="en-US" dirty="0"/>
           </a:p>
         </p:txBody>
       </p:sp>
@@ -3076,74 +3057,73 @@
           <a:lstStyle/>
           <a:p>
             <a:r>
-              <a:rPr lang="en-US" dirty="0" smtClean="0"/>
+              <a:rPr lang="en-US" dirty="0"/>
               <a:t>Others</a:t>
             </a:r>
+          </a:p>
+        </p:txBody>
+      </p:sp>
+      <p:sp>
+        <p:nvSpPr>
+          <p:cNvPr id="3" name="Content Placeholder 2"/>
+          <p:cNvSpPr>
+            <a:spLocks noGrp="1"/>
+          </p:cNvSpPr>
+          <p:nvPr>
+            <p:ph idx="1"/>
+          </p:nvPr>
+        </p:nvSpPr>
+        <p:spPr/>
+        <p:txBody>
+          <a:bodyPr/>
+          <a:lstStyle/>
+          <a:p>
+            <a:r>
+              <a:rPr lang="en-US" dirty="0" err="1"/>
+              <a:t>PyCharm</a:t>
+            </a:r>
             <a:endParaRPr lang="en-US" dirty="0"/>
           </a:p>
-        </p:txBody>
-      </p:sp>
-      <p:sp>
-        <p:nvSpPr>
-          <p:cNvPr id="3" name="Content Placeholder 2"/>
-          <p:cNvSpPr>
-            <a:spLocks noGrp="1"/>
-          </p:cNvSpPr>
-          <p:nvPr>
-            <p:ph idx="1"/>
-          </p:nvPr>
-        </p:nvSpPr>
-        <p:spPr/>
-        <p:txBody>
-          <a:bodyPr/>
-          <a:lstStyle/>
-          <a:p>
-            <a:r>
-              <a:rPr lang="en-US" dirty="0" err="1" smtClean="0"/>
-              <a:t>PyCharm</a:t>
-            </a:r>
-            <a:endParaRPr lang="en-US" dirty="0" smtClean="0"/>
-          </a:p>
-          <a:p>
-            <a:r>
-              <a:rPr lang="en-US" dirty="0" smtClean="0"/>
+          <a:p>
+            <a:r>
+              <a:rPr lang="en-US" dirty="0"/>
               <a:t>Eclipse</a:t>
             </a:r>
           </a:p>
           <a:p>
             <a:r>
-              <a:rPr lang="en-US" dirty="0" smtClean="0"/>
+              <a:rPr lang="en-US" dirty="0"/>
               <a:t>Visual Studio</a:t>
             </a:r>
           </a:p>
           <a:p>
             <a:r>
-              <a:rPr lang="en-US" dirty="0" smtClean="0"/>
+              <a:rPr lang="en-US" dirty="0"/>
               <a:t>Wing IDE</a:t>
             </a:r>
           </a:p>
           <a:p>
             <a:r>
-              <a:rPr lang="en-US" dirty="0" err="1" smtClean="0"/>
+              <a:rPr lang="en-US" dirty="0" err="1"/>
               <a:t>Spyder</a:t>
             </a:r>
-            <a:endParaRPr lang="en-US" dirty="0" smtClean="0"/>
-          </a:p>
-          <a:p>
-            <a:r>
-              <a:rPr lang="en-US" dirty="0" smtClean="0"/>
+            <a:endParaRPr lang="en-US" dirty="0"/>
+          </a:p>
+          <a:p>
+            <a:r>
+              <a:rPr lang="en-US" dirty="0"/>
               <a:t>Top 10 Python IDEs: </a:t>
             </a:r>
             <a:r>
-              <a:rPr lang="en-US" dirty="0" smtClean="0">
+              <a:rPr lang="en-US" dirty="0">
                 <a:hlinkClick r:id="rId2"/>
               </a:rPr>
               <a:t>http://noeticforce.com/best-python-ide-for-programmers-windows-and-mac</a:t>
             </a:r>
-            <a:endParaRPr lang="en-US" dirty="0" smtClean="0"/>
-          </a:p>
-          <a:p>
-            <a:endParaRPr lang="en-US" dirty="0" smtClean="0"/>
+            <a:endParaRPr lang="en-US" dirty="0"/>
+          </a:p>
+          <a:p>
+            <a:endParaRPr lang="en-US" dirty="0"/>
           </a:p>
           <a:p>
             <a:endParaRPr lang="en-US" dirty="0"/>
@@ -3196,10 +3176,9 @@
           <a:lstStyle/>
           <a:p>
             <a:r>
-              <a:rPr lang="en-US" dirty="0" smtClean="0"/>
+              <a:rPr lang="en-US" dirty="0"/>
               <a:t>Getting Help</a:t>
             </a:r>
-            <a:endParaRPr lang="en-US" dirty="0"/>
           </a:p>
         </p:txBody>
       </p:sp>
@@ -3232,13 +3211,6 @@
   <p:clrMapOvr>
     <a:masterClrMapping/>
   </p:clrMapOvr>
-  <p:timing>
-    <p:tnLst>
-      <p:par>
-        <p:cTn id="1" dur="indefinite" restart="never" nodeType="tmRoot"/>
-      </p:par>
-    </p:tnLst>
-  </p:timing>
 </p:sld>
 </file>
 
@@ -3275,10 +3247,9 @@
           <a:lstStyle/>
           <a:p>
             <a:r>
-              <a:rPr lang="en-US" dirty="0" smtClean="0"/>
+              <a:rPr lang="en-US" dirty="0"/>
               <a:t>Arcgis.com</a:t>
             </a:r>
-            <a:endParaRPr lang="en-US" dirty="0"/>
           </a:p>
         </p:txBody>
       </p:sp>
@@ -3315,13 +3286,6 @@
   <p:clrMapOvr>
     <a:masterClrMapping/>
   </p:clrMapOvr>
-  <p:timing>
-    <p:tnLst>
-      <p:par>
-        <p:cTn id="1" dur="indefinite" restart="never" nodeType="tmRoot"/>
-      </p:par>
-    </p:tnLst>
-  </p:timing>
 </p:sld>
 </file>
 
@@ -3358,10 +3322,9 @@
           <a:lstStyle/>
           <a:p>
             <a:r>
-              <a:rPr lang="en-US" dirty="0" smtClean="0"/>
+              <a:rPr lang="en-US" dirty="0"/>
               <a:t>Google!</a:t>
             </a:r>
-            <a:endParaRPr lang="en-US" dirty="0"/>
           </a:p>
         </p:txBody>
       </p:sp>
@@ -3386,20 +3349,19 @@
           <a:lstStyle/>
           <a:p>
             <a:r>
-              <a:rPr lang="en-US" dirty="0" smtClean="0"/>
+              <a:rPr lang="en-US" dirty="0"/>
               <a:t>For example, </a:t>
             </a:r>
             <a:r>
-              <a:rPr lang="en-US" dirty="0" smtClean="0">
+              <a:rPr lang="en-US" dirty="0">
                 <a:hlinkClick r:id="rId2"/>
               </a:rPr>
               <a:t>Google</a:t>
             </a:r>
             <a:r>
-              <a:rPr lang="en-US" dirty="0" smtClean="0"/>
+              <a:rPr lang="en-US" dirty="0"/>
               <a:t> “Python dictionary”</a:t>
             </a:r>
-            <a:endParaRPr lang="en-US" dirty="0"/>
           </a:p>
         </p:txBody>
       </p:sp>
@@ -3436,13 +3398,6 @@
   <p:clrMapOvr>
     <a:masterClrMapping/>
   </p:clrMapOvr>
-  <p:timing>
-    <p:tnLst>
-      <p:par>
-        <p:cTn id="1" dur="indefinite" restart="never" nodeType="tmRoot"/>
-      </p:par>
-    </p:tnLst>
-  </p:timing>
 </p:sld>
 </file>
 
@@ -3479,10 +3434,9 @@
           <a:lstStyle/>
           <a:p>
             <a:r>
-              <a:rPr lang="en-US" dirty="0" smtClean="0"/>
+              <a:rPr lang="en-US" dirty="0"/>
               <a:t>Stack Overflow</a:t>
             </a:r>
-            <a:endParaRPr lang="en-US" dirty="0"/>
           </a:p>
         </p:txBody>
       </p:sp>
@@ -3556,10 +3510,9 @@
           <a:lstStyle/>
           <a:p>
             <a:r>
-              <a:rPr lang="en-US" dirty="0" smtClean="0"/>
+              <a:rPr lang="en-US" dirty="0"/>
               <a:t>GitHub</a:t>
             </a:r>
-            <a:endParaRPr lang="en-US" dirty="0"/>
           </a:p>
         </p:txBody>
       </p:sp>
@@ -3632,10 +3585,9 @@
           <a:lstStyle/>
           <a:p>
             <a:r>
-              <a:rPr lang="en-US" dirty="0" smtClean="0"/>
+              <a:rPr lang="en-US" dirty="0"/>
               <a:t>Open Your IDE; Let’s Get Started!</a:t>
             </a:r>
-            <a:endParaRPr lang="en-US" dirty="0"/>
           </a:p>
         </p:txBody>
       </p:sp>
@@ -3704,10 +3656,9 @@
           <a:lstStyle/>
           <a:p>
             <a:r>
-              <a:rPr lang="en-US" dirty="0" smtClean="0"/>
+              <a:rPr lang="en-US" dirty="0"/>
               <a:t>Python</a:t>
             </a:r>
-            <a:endParaRPr lang="en-US" dirty="0"/>
           </a:p>
         </p:txBody>
       </p:sp>
@@ -3734,7 +3685,7 @@
           <a:lstStyle/>
           <a:p>
             <a:r>
-              <a:rPr lang="en-US" dirty="0" smtClean="0"/>
+              <a:rPr lang="en-US" dirty="0"/>
               <a:t>Created in 1989 by Guido van Rossum</a:t>
             </a:r>
           </a:p>
@@ -3743,11 +3694,11 @@
           </a:p>
           <a:p>
             <a:r>
-              <a:rPr lang="en-US" dirty="0" smtClean="0"/>
+              <a:rPr lang="en-US" dirty="0"/>
               <a:t>Named after </a:t>
             </a:r>
             <a:r>
-              <a:rPr lang="en-US" i="1" dirty="0" smtClean="0"/>
+              <a:rPr lang="en-US" i="1" dirty="0"/>
               <a:t>Monty Python</a:t>
             </a:r>
           </a:p>
@@ -3756,7 +3707,7 @@
           </a:p>
           <a:p>
             <a:r>
-              <a:rPr lang="en-US" dirty="0" smtClean="0"/>
+              <a:rPr lang="en-US" dirty="0"/>
               <a:t>Evolved into a major programming language</a:t>
             </a:r>
           </a:p>
@@ -3768,16 +3719,10 @@
               <a:rPr lang="en-US" dirty="0">
                 <a:hlinkClick r:id="rId2"/>
               </a:rPr>
-              <a:t>http://www.tiobe.com/tiobe-index</a:t>
-            </a:r>
-            <a:r>
-              <a:rPr lang="en-US" dirty="0" smtClean="0">
-                <a:hlinkClick r:id="rId2"/>
-              </a:rPr>
-              <a:t>/</a:t>
-            </a:r>
-            <a:r>
-              <a:rPr lang="en-US" dirty="0" smtClean="0"/>
+              <a:t>http://www.tiobe.com/tiobe-index/</a:t>
+            </a:r>
+            <a:r>
+              <a:rPr lang="en-US" dirty="0"/>
               <a:t> </a:t>
             </a:r>
           </a:p>
@@ -3852,52 +3797,49 @@
           <a:lstStyle/>
           <a:p>
             <a:r>
-              <a:rPr lang="en-US" dirty="0" smtClean="0"/>
+              <a:rPr lang="en-US" dirty="0"/>
               <a:t>Advantages to Python</a:t>
             </a:r>
+          </a:p>
+        </p:txBody>
+      </p:sp>
+      <p:sp>
+        <p:nvSpPr>
+          <p:cNvPr id="3" name="Content Placeholder 2"/>
+          <p:cNvSpPr>
+            <a:spLocks noGrp="1"/>
+          </p:cNvSpPr>
+          <p:nvPr>
+            <p:ph idx="1"/>
+          </p:nvPr>
+        </p:nvSpPr>
+        <p:spPr/>
+        <p:txBody>
+          <a:bodyPr/>
+          <a:lstStyle/>
+          <a:p>
+            <a:r>
+              <a:rPr lang="en-US" dirty="0"/>
+              <a:t>Simple syntax: easy to read and write</a:t>
+            </a:r>
+          </a:p>
+          <a:p>
             <a:endParaRPr lang="en-US" dirty="0"/>
           </a:p>
-        </p:txBody>
-      </p:sp>
-      <p:sp>
-        <p:nvSpPr>
-          <p:cNvPr id="3" name="Content Placeholder 2"/>
-          <p:cNvSpPr>
-            <a:spLocks noGrp="1"/>
-          </p:cNvSpPr>
-          <p:nvPr>
-            <p:ph idx="1"/>
-          </p:nvPr>
-        </p:nvSpPr>
-        <p:spPr/>
-        <p:txBody>
-          <a:bodyPr/>
-          <a:lstStyle/>
-          <a:p>
-            <a:r>
-              <a:rPr lang="en-US" dirty="0" smtClean="0"/>
-              <a:t>Simple syntax: easy to read and write</a:t>
-            </a:r>
+          <a:p>
+            <a:r>
+              <a:rPr lang="en-US" dirty="0"/>
+              <a:t>Allows for rapid testing and development</a:t>
+            </a:r>
+          </a:p>
+          <a:p>
             <a:endParaRPr lang="en-US" dirty="0"/>
           </a:p>
           <a:p>
-            <a:endParaRPr lang="en-US" dirty="0" smtClean="0"/>
-          </a:p>
-          <a:p>
-            <a:r>
-              <a:rPr lang="en-US" dirty="0" smtClean="0"/>
-              <a:t>Allows for rapid testing and development</a:t>
-            </a:r>
-          </a:p>
-          <a:p>
-            <a:endParaRPr lang="en-US" dirty="0"/>
-          </a:p>
-          <a:p>
-            <a:r>
-              <a:rPr lang="en-US" dirty="0" smtClean="0"/>
+            <a:r>
+              <a:rPr lang="en-US" dirty="0"/>
               <a:t>Open Source</a:t>
             </a:r>
-            <a:endParaRPr lang="en-US" dirty="0"/>
           </a:p>
         </p:txBody>
       </p:sp>
@@ -3947,31 +3889,47 @@
           <a:lstStyle/>
           <a:p>
             <a:r>
-              <a:rPr lang="en-US" dirty="0" smtClean="0"/>
+              <a:rPr lang="en-US" dirty="0"/>
               <a:t>An Interpreted Language</a:t>
             </a:r>
+          </a:p>
+        </p:txBody>
+      </p:sp>
+      <p:sp>
+        <p:nvSpPr>
+          <p:cNvPr id="3" name="Content Placeholder 2"/>
+          <p:cNvSpPr>
+            <a:spLocks noGrp="1"/>
+          </p:cNvSpPr>
+          <p:nvPr>
+            <p:ph idx="1"/>
+          </p:nvPr>
+        </p:nvSpPr>
+        <p:spPr/>
+        <p:txBody>
+          <a:bodyPr/>
+          <a:lstStyle/>
+          <a:p>
+            <a:r>
+              <a:rPr lang="en-US" dirty="0"/>
+              <a:t>Code is compiled when it is executed</a:t>
+            </a:r>
+          </a:p>
+          <a:p>
             <a:endParaRPr lang="en-US" dirty="0"/>
           </a:p>
-        </p:txBody>
-      </p:sp>
-      <p:sp>
-        <p:nvSpPr>
-          <p:cNvPr id="3" name="Content Placeholder 2"/>
-          <p:cNvSpPr>
-            <a:spLocks noGrp="1"/>
-          </p:cNvSpPr>
-          <p:nvPr>
-            <p:ph idx="1"/>
-          </p:nvPr>
-        </p:nvSpPr>
-        <p:spPr/>
-        <p:txBody>
-          <a:bodyPr/>
-          <a:lstStyle/>
-          <a:p>
-            <a:r>
-              <a:rPr lang="en-US" dirty="0" smtClean="0"/>
-              <a:t>Code is compiled when it is executed</a:t>
+          <a:p>
+            <a:r>
+              <a:rPr lang="en-US" dirty="0"/>
+              <a:t>.</a:t>
+            </a:r>
+            <a:r>
+              <a:rPr lang="en-US" dirty="0" err="1"/>
+              <a:t>py</a:t>
+            </a:r>
+            <a:r>
+              <a:rPr lang="en-US" dirty="0"/>
+              <a:t> file – Python code</a:t>
             </a:r>
           </a:p>
           <a:p>
@@ -3979,35 +3937,17 @@
           </a:p>
           <a:p>
             <a:r>
-              <a:rPr lang="en-US" dirty="0" smtClean="0"/>
+              <a:rPr lang="en-US" dirty="0"/>
               <a:t>.</a:t>
             </a:r>
             <a:r>
-              <a:rPr lang="en-US" dirty="0" err="1" smtClean="0"/>
-              <a:t>py</a:t>
-            </a:r>
-            <a:r>
-              <a:rPr lang="en-US" dirty="0" smtClean="0"/>
-              <a:t> file – Python code</a:t>
-            </a:r>
-          </a:p>
-          <a:p>
-            <a:endParaRPr lang="en-US" dirty="0"/>
-          </a:p>
-          <a:p>
-            <a:r>
-              <a:rPr lang="en-US" dirty="0" smtClean="0"/>
-              <a:t>.</a:t>
-            </a:r>
-            <a:r>
-              <a:rPr lang="en-US" dirty="0" err="1" smtClean="0"/>
+              <a:rPr lang="en-US" dirty="0" err="1"/>
               <a:t>pyc</a:t>
             </a:r>
             <a:r>
-              <a:rPr lang="en-US" dirty="0" smtClean="0"/>
+              <a:rPr lang="en-US" dirty="0"/>
               <a:t> file – Compiled Python code</a:t>
             </a:r>
-            <a:endParaRPr lang="en-US" dirty="0"/>
           </a:p>
         </p:txBody>
       </p:sp>
@@ -4057,95 +3997,94 @@
           <a:lstStyle/>
           <a:p>
             <a:r>
-              <a:rPr lang="en-US" dirty="0" smtClean="0"/>
+              <a:rPr lang="en-US" dirty="0"/>
               <a:t>“Built-In” Libraries</a:t>
             </a:r>
+          </a:p>
+        </p:txBody>
+      </p:sp>
+      <p:sp>
+        <p:nvSpPr>
+          <p:cNvPr id="3" name="Content Placeholder 2"/>
+          <p:cNvSpPr>
+            <a:spLocks noGrp="1"/>
+          </p:cNvSpPr>
+          <p:nvPr>
+            <p:ph idx="1"/>
+          </p:nvPr>
+        </p:nvSpPr>
+        <p:spPr/>
+        <p:txBody>
+          <a:bodyPr/>
+          <a:lstStyle/>
+          <a:p>
+            <a:r>
+              <a:rPr lang="en-US" dirty="0"/>
+              <a:t>Python come with a lot of great capabilities</a:t>
+            </a:r>
+          </a:p>
+          <a:p>
+            <a:pPr lvl="1"/>
+            <a:r>
+              <a:rPr lang="en-US" dirty="0"/>
+              <a:t>String </a:t>
+            </a:r>
+            <a:r>
+              <a:rPr lang="en-US" dirty="0" err="1"/>
+              <a:t>manipuylations</a:t>
+            </a:r>
+            <a:r>
+              <a:rPr lang="en-US" dirty="0"/>
+              <a:t>, math, http calls, and more</a:t>
+            </a:r>
+          </a:p>
+          <a:p>
             <a:endParaRPr lang="en-US" dirty="0"/>
           </a:p>
-        </p:txBody>
-      </p:sp>
-      <p:sp>
-        <p:nvSpPr>
-          <p:cNvPr id="3" name="Content Placeholder 2"/>
-          <p:cNvSpPr>
-            <a:spLocks noGrp="1"/>
-          </p:cNvSpPr>
-          <p:nvPr>
-            <p:ph idx="1"/>
-          </p:nvPr>
-        </p:nvSpPr>
-        <p:spPr/>
-        <p:txBody>
-          <a:bodyPr/>
-          <a:lstStyle/>
-          <a:p>
-            <a:r>
-              <a:rPr lang="en-US" dirty="0" smtClean="0"/>
-              <a:t>Python come with a lot of great capabilities</a:t>
+          <a:p>
+            <a:r>
+              <a:rPr lang="en-US" dirty="0"/>
+              <a:t>If it isn’t “built-in”, there is probably an </a:t>
+            </a:r>
+            <a:r>
+              <a:rPr lang="en-US" i="1" dirty="0"/>
+              <a:t>import</a:t>
             </a:r>
           </a:p>
           <a:p>
             <a:pPr lvl="1"/>
             <a:r>
-              <a:rPr lang="en-US" dirty="0" smtClean="0"/>
-              <a:t>String </a:t>
-            </a:r>
-            <a:r>
-              <a:rPr lang="en-US" dirty="0" err="1" smtClean="0"/>
-              <a:t>manipuylations</a:t>
-            </a:r>
-            <a:r>
-              <a:rPr lang="en-US" dirty="0" smtClean="0"/>
-              <a:t>, math, http calls, and more</a:t>
-            </a:r>
-          </a:p>
-          <a:p>
-            <a:endParaRPr lang="en-US" dirty="0"/>
-          </a:p>
-          <a:p>
-            <a:r>
-              <a:rPr lang="en-US" dirty="0" smtClean="0"/>
-              <a:t>If it isn’t “built-in”, there is probably an </a:t>
-            </a:r>
-            <a:r>
-              <a:rPr lang="en-US" i="1" dirty="0" smtClean="0"/>
-              <a:t>import</a:t>
-            </a:r>
-          </a:p>
-          <a:p>
-            <a:pPr lvl="1"/>
-            <a:r>
-              <a:rPr lang="en-US" i="1" dirty="0" err="1" smtClean="0">
+              <a:rPr lang="en-US" i="1" dirty="0" err="1">
                 <a:hlinkClick r:id="rId2"/>
               </a:rPr>
               <a:t>Numpy</a:t>
             </a:r>
-            <a:endParaRPr lang="en-US" i="1" dirty="0" smtClean="0"/>
+            <a:endParaRPr lang="en-US" i="1" dirty="0"/>
           </a:p>
           <a:p>
             <a:pPr lvl="1"/>
             <a:r>
-              <a:rPr lang="en-US" i="1" dirty="0" smtClean="0">
+              <a:rPr lang="en-US" i="1" dirty="0">
                 <a:hlinkClick r:id="rId3"/>
               </a:rPr>
               <a:t>Requests</a:t>
             </a:r>
-            <a:endParaRPr lang="en-US" i="1" dirty="0" smtClean="0"/>
+            <a:endParaRPr lang="en-US" i="1" dirty="0"/>
           </a:p>
           <a:p>
             <a:pPr lvl="1"/>
             <a:r>
-              <a:rPr lang="en-US" i="1" dirty="0" smtClean="0">
+              <a:rPr lang="en-US" i="1" dirty="0">
                 <a:hlinkClick r:id="rId4"/>
               </a:rPr>
               <a:t>Urllib2</a:t>
             </a:r>
-            <a:endParaRPr lang="en-US" i="1" dirty="0" smtClean="0"/>
+            <a:endParaRPr lang="en-US" i="1" dirty="0"/>
           </a:p>
           <a:p>
             <a:pPr lvl="1"/>
             <a:r>
-              <a:rPr lang="en-US" i="1" dirty="0" err="1" smtClean="0">
+              <a:rPr lang="en-US" i="1" dirty="0" err="1">
                 <a:hlinkClick r:id="rId5"/>
               </a:rPr>
               <a:t>scipy</a:t>
@@ -4203,68 +4142,67 @@
           <a:lstStyle/>
           <a:p>
             <a:r>
-              <a:rPr lang="en-US" dirty="0" smtClean="0"/>
+              <a:rPr lang="en-US" dirty="0"/>
               <a:t>A “Glue” Language</a:t>
             </a:r>
+          </a:p>
+        </p:txBody>
+      </p:sp>
+      <p:sp>
+        <p:nvSpPr>
+          <p:cNvPr id="3" name="Content Placeholder 2"/>
+          <p:cNvSpPr>
+            <a:spLocks noGrp="1"/>
+          </p:cNvSpPr>
+          <p:nvPr>
+            <p:ph idx="1"/>
+          </p:nvPr>
+        </p:nvSpPr>
+        <p:spPr/>
+        <p:txBody>
+          <a:bodyPr/>
+          <a:lstStyle/>
+          <a:p>
+            <a:r>
+              <a:rPr lang="en-US" dirty="0"/>
+              <a:t>Using Python to control other languages</a:t>
+            </a:r>
+          </a:p>
+          <a:p>
             <a:endParaRPr lang="en-US" dirty="0"/>
           </a:p>
-        </p:txBody>
-      </p:sp>
-      <p:sp>
-        <p:nvSpPr>
-          <p:cNvPr id="3" name="Content Placeholder 2"/>
-          <p:cNvSpPr>
-            <a:spLocks noGrp="1"/>
-          </p:cNvSpPr>
-          <p:nvPr>
-            <p:ph idx="1"/>
-          </p:nvPr>
-        </p:nvSpPr>
-        <p:spPr/>
-        <p:txBody>
-          <a:bodyPr/>
-          <a:lstStyle/>
-          <a:p>
-            <a:r>
-              <a:rPr lang="en-US" dirty="0" smtClean="0"/>
-              <a:t>Using Python to control other languages</a:t>
-            </a:r>
-          </a:p>
-          <a:p>
+          <a:p>
+            <a:r>
+              <a:rPr lang="en-US" dirty="0"/>
+              <a:t>Great at allowing programmers to quickly pull together a lot of </a:t>
+            </a:r>
+            <a:r>
+              <a:rPr lang="en-US" dirty="0" err="1"/>
+              <a:t>apabilities</a:t>
+            </a:r>
             <a:endParaRPr lang="en-US" dirty="0"/>
           </a:p>
           <a:p>
-            <a:r>
-              <a:rPr lang="en-US" dirty="0" smtClean="0"/>
-              <a:t>Great at allowing programmers to quickly pull together a lot of </a:t>
-            </a:r>
-            <a:r>
-              <a:rPr lang="en-US" dirty="0" err="1" smtClean="0"/>
-              <a:t>apabilities</a:t>
-            </a:r>
-            <a:endParaRPr lang="en-US" dirty="0" smtClean="0"/>
-          </a:p>
-          <a:p>
             <a:endParaRPr lang="en-US" dirty="0"/>
           </a:p>
           <a:p>
             <a:r>
-              <a:rPr lang="en-US" dirty="0" smtClean="0"/>
+              <a:rPr lang="en-US" dirty="0"/>
               <a:t>In reality, Python is more than a “glue” language. </a:t>
             </a:r>
           </a:p>
           <a:p>
             <a:pPr lvl="1"/>
             <a:r>
-              <a:rPr lang="en-US" dirty="0" smtClean="0"/>
+              <a:rPr lang="en-US" dirty="0"/>
               <a:t>Python is behind the scenes in websites, </a:t>
             </a:r>
             <a:r>
-              <a:rPr lang="en-US" dirty="0" err="1" smtClean="0"/>
+              <a:rPr lang="en-US" dirty="0" err="1"/>
               <a:t>geoprocessing</a:t>
             </a:r>
             <a:r>
-              <a:rPr lang="en-US" dirty="0" smtClean="0"/>
+              <a:rPr lang="en-US" dirty="0"/>
               <a:t> tools, and much more</a:t>
             </a:r>
           </a:p>
@@ -4322,10 +4260,9 @@
           <a:lstStyle/>
           <a:p>
             <a:r>
-              <a:rPr lang="en-US" dirty="0" smtClean="0"/>
+              <a:rPr lang="en-US" dirty="0"/>
               <a:t>IDE – Integrated Development Environment</a:t>
             </a:r>
-            <a:endParaRPr lang="en-US" dirty="0"/>
           </a:p>
         </p:txBody>
       </p:sp>
@@ -4345,10 +4282,9 @@
           <a:lstStyle/>
           <a:p>
             <a:r>
-              <a:rPr lang="en-US" dirty="0" smtClean="0"/>
+              <a:rPr lang="en-US" dirty="0"/>
               <a:t>Where you can write, test, debug, and run code</a:t>
             </a:r>
-            <a:endParaRPr lang="en-US" dirty="0"/>
           </a:p>
         </p:txBody>
       </p:sp>
@@ -4398,10 +4334,9 @@
           <a:lstStyle/>
           <a:p>
             <a:r>
-              <a:rPr lang="en-US" dirty="0" smtClean="0"/>
+              <a:rPr lang="en-US" dirty="0"/>
               <a:t>IDLE – Default IDE </a:t>
             </a:r>
-            <a:endParaRPr lang="en-US" dirty="0"/>
           </a:p>
         </p:txBody>
       </p:sp>
@@ -4511,7 +4446,7 @@
           <a:lstStyle/>
           <a:p>
             <a:r>
-              <a:rPr lang="en-US" dirty="0" err="1" smtClean="0"/>
+              <a:rPr lang="en-US" dirty="0" err="1"/>
               <a:t>Pyscripter</a:t>
             </a:r>
             <a:endParaRPr lang="en-US" dirty="0"/>
@@ -4534,49 +4469,41 @@
           <a:lstStyle/>
           <a:p>
             <a:r>
-              <a:rPr lang="en-US" dirty="0" smtClean="0"/>
-              <a:t>More </a:t>
-            </a:r>
-            <a:r>
-              <a:rPr lang="en-US" dirty="0" smtClean="0"/>
-              <a:t>popular </a:t>
-            </a:r>
-            <a:r>
-              <a:rPr lang="en-US" dirty="0" smtClean="0"/>
-              <a:t>than IDL</a:t>
-            </a:r>
-          </a:p>
-          <a:p>
-            <a:endParaRPr lang="en-US" dirty="0" smtClean="0"/>
-          </a:p>
-          <a:p>
-            <a:r>
-              <a:rPr lang="en-US" dirty="0" smtClean="0"/>
+              <a:rPr lang="en-US" dirty="0"/>
+              <a:t>More popular than IDL</a:t>
+            </a:r>
+          </a:p>
+          <a:p>
+            <a:endParaRPr lang="en-US" dirty="0"/>
+          </a:p>
+          <a:p>
+            <a:r>
+              <a:rPr lang="en-US" dirty="0"/>
               <a:t>Has code completion</a:t>
             </a:r>
           </a:p>
           <a:p>
-            <a:endParaRPr lang="en-US" dirty="0" smtClean="0"/>
-          </a:p>
-          <a:p>
-            <a:r>
-              <a:rPr lang="en-US" dirty="0" smtClean="0"/>
+            <a:endParaRPr lang="en-US" dirty="0"/>
+          </a:p>
+          <a:p>
+            <a:r>
+              <a:rPr lang="en-US" dirty="0"/>
               <a:t>Has debugging</a:t>
             </a:r>
           </a:p>
           <a:p>
-            <a:endParaRPr lang="en-US" dirty="0" smtClean="0">
+            <a:endParaRPr lang="en-US" dirty="0">
               <a:hlinkClick r:id="rId2"/>
             </a:endParaRPr>
           </a:p>
           <a:p>
             <a:r>
-              <a:rPr lang="en-US" dirty="0" smtClean="0">
+              <a:rPr lang="en-US" dirty="0">
                 <a:hlinkClick r:id="rId2"/>
               </a:rPr>
               <a:t>https://sourceforge.net/projects/pyscripter/</a:t>
             </a:r>
-            <a:endParaRPr lang="en-US" dirty="0" smtClean="0"/>
+            <a:endParaRPr lang="en-US" dirty="0"/>
           </a:p>
           <a:p>
             <a:endParaRPr lang="en-US" dirty="0"/>

</xml_diff>